<commit_message>
Presentation : small changes
</commit_message>
<xml_diff>
--- a/Presentation/Presentation.pptx
+++ b/Presentation/Presentation.pptx
@@ -3162,10 +3162,6 @@
               <a:rPr lang="fr-FR" dirty="0"/>
               <a:t> </a:t>
             </a:r>
-            <a:r>
-              <a:rPr lang="fr-FR" dirty="0"/>
-              <a:t/>
-            </a:r>
             <a:br>
               <a:rPr lang="fr-FR" dirty="0"/>
             </a:br>
@@ -3271,7 +3267,6 @@
               <a:rPr lang="fr-FR" sz="2400" dirty="0"/>
               <a:t>David </a:t>
             </a:r>
-            <a:endParaRPr lang="fr-FR" sz="2400" dirty="0"/>
           </a:p>
           <a:p>
             <a:endParaRPr lang="fr-FR" sz="2400" dirty="0"/>
@@ -3288,6 +3283,13 @@
   <p:clrMapOvr>
     <a:masterClrMapping/>
   </p:clrMapOvr>
+  <p:timing>
+    <p:tnLst>
+      <p:par>
+        <p:cTn xmlns:p14="http://schemas.microsoft.com/office/powerpoint/2010/main" id="1" dur="indefinite" restart="never" nodeType="tmRoot"/>
+      </p:par>
+    </p:tnLst>
+  </p:timing>
 </p:sld>
 </file>
 
@@ -3433,6 +3435,13 @@
   <p:clrMapOvr>
     <a:masterClrMapping/>
   </p:clrMapOvr>
+  <p:timing>
+    <p:tnLst>
+      <p:par>
+        <p:cTn xmlns:p14="http://schemas.microsoft.com/office/powerpoint/2010/main" id="1" dur="indefinite" restart="never" nodeType="tmRoot"/>
+      </p:par>
+    </p:tnLst>
+  </p:timing>
 </p:sld>
 </file>
 
@@ -3581,6 +3590,13 @@
   <p:clrMapOvr>
     <a:masterClrMapping/>
   </p:clrMapOvr>
+  <p:timing>
+    <p:tnLst>
+      <p:par>
+        <p:cTn xmlns:p14="http://schemas.microsoft.com/office/powerpoint/2010/main" id="1" dur="indefinite" restart="never" nodeType="tmRoot"/>
+      </p:par>
+    </p:tnLst>
+  </p:timing>
 </p:sld>
 </file>
 
@@ -3636,7 +3652,9 @@
         </p:nvSpPr>
         <p:spPr/>
         <p:txBody>
-          <a:bodyPr/>
+          <a:bodyPr>
+            <a:normAutofit/>
+          </a:bodyPr>
           <a:lstStyle/>
           <a:p>
             <a:r>
@@ -3684,6 +3702,21 @@
             </a:r>
           </a:p>
           <a:p>
+            <a:pPr lvl="2"/>
+            <a:r>
+              <a:rPr lang="fr-FR" dirty="0" smtClean="0"/>
+              <a:t>[</a:t>
+            </a:r>
+            <a:r>
+              <a:rPr lang="fr-FR" dirty="0" err="1" smtClean="0"/>
+              <a:t>img</a:t>
+            </a:r>
+            <a:r>
+              <a:rPr lang="fr-FR" dirty="0" smtClean="0"/>
+              <a:t>]</a:t>
+            </a:r>
+          </a:p>
+          <a:p>
             <a:pPr lvl="1"/>
             <a:r>
               <a:rPr lang="fr-FR" dirty="0" err="1" smtClean="0"/>
@@ -3700,6 +3733,22 @@
             <a:r>
               <a:rPr lang="fr-FR" dirty="0" smtClean="0"/>
               <a:t> motion model</a:t>
+            </a:r>
+            <a:endParaRPr lang="fr-FR" dirty="0"/>
+          </a:p>
+          <a:p>
+            <a:pPr lvl="2"/>
+            <a:r>
+              <a:rPr lang="fr-FR" dirty="0"/>
+              <a:t>[</a:t>
+            </a:r>
+            <a:r>
+              <a:rPr lang="fr-FR" dirty="0" err="1"/>
+              <a:t>img</a:t>
+            </a:r>
+            <a:r>
+              <a:rPr lang="fr-FR" dirty="0" smtClean="0"/>
+              <a:t>]</a:t>
             </a:r>
           </a:p>
           <a:p>
@@ -3917,7 +3966,6 @@
               <a:rPr lang="fr-FR" dirty="0"/>
               <a:t> motion model </a:t>
             </a:r>
-            <a:endParaRPr lang="fr-FR" dirty="0"/>
           </a:p>
           <a:p>
             <a:pPr lvl="1"/>
@@ -4083,7 +4131,6 @@
               <a:rPr lang="cs-CZ" dirty="0"/>
               <a:t>∆ t </a:t>
             </a:r>
-            <a:endParaRPr lang="cs-CZ" dirty="0"/>
           </a:p>
           <a:p>
             <a:pPr lvl="1"/>
@@ -4378,11 +4425,7 @@
           <a:p>
             <a:r>
               <a:rPr lang="fr-FR" dirty="0" smtClean="0"/>
-              <a:t>Last </a:t>
-            </a:r>
-            <a:r>
-              <a:rPr lang="fr-FR" dirty="0" err="1" smtClean="0"/>
-              <a:t>words</a:t>
+              <a:t>Conclusion</a:t>
             </a:r>
             <a:endParaRPr lang="fr-FR" dirty="0"/>
           </a:p>
@@ -4400,16 +4443,216 @@
         </p:nvSpPr>
         <p:spPr/>
         <p:txBody>
-          <a:bodyPr/>
-          <a:lstStyle/>
-          <a:p>
-            <a:r>
-              <a:rPr lang="fr-FR" dirty="0" err="1" smtClean="0"/>
-              <a:t>You’ll</a:t>
-            </a:r>
-            <a:r>
-              <a:rPr lang="fr-FR" dirty="0" smtClean="0"/>
-              <a:t> die</a:t>
+          <a:bodyPr>
+            <a:normAutofit fontScale="92500" lnSpcReduction="10000"/>
+          </a:bodyPr>
+          <a:lstStyle/>
+          <a:p>
+            <a:r>
+              <a:rPr lang="fr-FR" dirty="0" smtClean="0"/>
+              <a:t>The more </a:t>
+            </a:r>
+            <a:r>
+              <a:rPr lang="fr-FR" dirty="0" err="1" smtClean="0"/>
+              <a:t>complex</a:t>
+            </a:r>
+            <a:r>
+              <a:rPr lang="fr-FR" dirty="0" smtClean="0"/>
+              <a:t> the motion model, the more </a:t>
+            </a:r>
+            <a:r>
+              <a:rPr lang="fr-FR" dirty="0" err="1" smtClean="0"/>
+              <a:t>accurate</a:t>
+            </a:r>
+            <a:r>
+              <a:rPr lang="fr-FR" dirty="0" smtClean="0"/>
+              <a:t> the </a:t>
+            </a:r>
+            <a:r>
+              <a:rPr lang="fr-FR" dirty="0" err="1" smtClean="0"/>
+              <a:t>predictor</a:t>
+            </a:r>
+            <a:r>
+              <a:rPr lang="fr-FR" dirty="0" smtClean="0"/>
+              <a:t>. But one has to </a:t>
+            </a:r>
+            <a:r>
+              <a:rPr lang="fr-FR" dirty="0" err="1" smtClean="0"/>
+              <a:t>keep</a:t>
+            </a:r>
+            <a:r>
+              <a:rPr lang="fr-FR" dirty="0" smtClean="0"/>
+              <a:t> in </a:t>
+            </a:r>
+            <a:r>
+              <a:rPr lang="fr-FR" dirty="0" err="1" smtClean="0"/>
+              <a:t>mind</a:t>
+            </a:r>
+            <a:r>
+              <a:rPr lang="fr-FR" dirty="0" smtClean="0"/>
+              <a:t> the </a:t>
+            </a:r>
+            <a:r>
+              <a:rPr lang="fr-FR" dirty="0" err="1" smtClean="0"/>
+              <a:t>computational</a:t>
+            </a:r>
+            <a:r>
+              <a:rPr lang="fr-FR" dirty="0" smtClean="0"/>
+              <a:t> </a:t>
+            </a:r>
+            <a:r>
+              <a:rPr lang="fr-FR" dirty="0" err="1" smtClean="0"/>
+              <a:t>cost</a:t>
+            </a:r>
+            <a:r>
+              <a:rPr lang="fr-FR" dirty="0" smtClean="0"/>
+              <a:t>.</a:t>
+            </a:r>
+          </a:p>
+          <a:p>
+            <a:pPr marL="0" indent="0">
+              <a:buNone/>
+            </a:pPr>
+            <a:endParaRPr lang="fr-FR" dirty="0" smtClean="0"/>
+          </a:p>
+          <a:p>
+            <a:r>
+              <a:rPr lang="fr-FR" dirty="0" err="1" smtClean="0"/>
+              <a:t>Further</a:t>
+            </a:r>
+            <a:r>
+              <a:rPr lang="fr-FR" dirty="0" smtClean="0"/>
+              <a:t> possible optimisation : </a:t>
+            </a:r>
+          </a:p>
+          <a:p>
+            <a:pPr lvl="1"/>
+            <a:r>
+              <a:rPr lang="fr-FR" dirty="0" err="1" smtClean="0"/>
+              <a:t>Consider</a:t>
+            </a:r>
+            <a:r>
+              <a:rPr lang="fr-FR" dirty="0" smtClean="0"/>
+              <a:t> a motion model </a:t>
+            </a:r>
+            <a:r>
+              <a:rPr lang="fr-FR" dirty="0" err="1" smtClean="0"/>
+              <a:t>specific</a:t>
+            </a:r>
+            <a:r>
+              <a:rPr lang="fr-FR" dirty="0" smtClean="0"/>
+              <a:t> to the </a:t>
+            </a:r>
+            <a:r>
+              <a:rPr lang="fr-FR" dirty="0" err="1" smtClean="0"/>
+              <a:t>quadrotor</a:t>
+            </a:r>
+            <a:r>
+              <a:rPr lang="fr-FR" dirty="0" smtClean="0"/>
+              <a:t> </a:t>
+            </a:r>
+            <a:r>
+              <a:rPr lang="fr-FR" dirty="0" err="1" smtClean="0"/>
+              <a:t>tracked</a:t>
+            </a:r>
+            <a:r>
+              <a:rPr lang="fr-FR" dirty="0" smtClean="0"/>
+              <a:t> (</a:t>
+            </a:r>
+            <a:r>
+              <a:rPr lang="fr-FR" dirty="0" err="1" smtClean="0"/>
+              <a:t>necessitates</a:t>
+            </a:r>
+            <a:r>
+              <a:rPr lang="fr-FR" dirty="0" smtClean="0"/>
+              <a:t> a more </a:t>
+            </a:r>
+            <a:r>
+              <a:rPr lang="fr-FR" dirty="0" err="1" smtClean="0"/>
+              <a:t>advanced</a:t>
+            </a:r>
+            <a:r>
+              <a:rPr lang="fr-FR" dirty="0" smtClean="0"/>
+              <a:t> </a:t>
+            </a:r>
+            <a:r>
+              <a:rPr lang="fr-FR" dirty="0" err="1" smtClean="0"/>
+              <a:t>analysis</a:t>
+            </a:r>
+            <a:r>
+              <a:rPr lang="fr-FR" dirty="0" smtClean="0"/>
+              <a:t> of the </a:t>
+            </a:r>
+            <a:r>
+              <a:rPr lang="fr-FR" dirty="0" err="1" smtClean="0"/>
+              <a:t>dynamics</a:t>
+            </a:r>
+            <a:r>
+              <a:rPr lang="fr-FR" dirty="0" smtClean="0"/>
+              <a:t> of the </a:t>
+            </a:r>
+            <a:r>
+              <a:rPr lang="fr-FR" dirty="0" err="1" smtClean="0"/>
+              <a:t>plateform</a:t>
+            </a:r>
+            <a:r>
+              <a:rPr lang="fr-FR" dirty="0" smtClean="0"/>
+              <a:t>)</a:t>
+            </a:r>
+          </a:p>
+          <a:p>
+            <a:pPr lvl="1"/>
+            <a:r>
+              <a:rPr lang="fr-FR" dirty="0" smtClean="0"/>
+              <a:t> </a:t>
+            </a:r>
+            <a:r>
+              <a:rPr lang="fr-FR" dirty="0" err="1" smtClean="0"/>
+              <a:t>Consider</a:t>
+            </a:r>
+            <a:r>
+              <a:rPr lang="fr-FR" dirty="0" smtClean="0"/>
+              <a:t> </a:t>
+            </a:r>
+            <a:r>
+              <a:rPr lang="fr-FR" dirty="0" err="1" smtClean="0"/>
+              <a:t>that</a:t>
+            </a:r>
+            <a:r>
+              <a:rPr lang="fr-FR" dirty="0" smtClean="0"/>
+              <a:t> the </a:t>
+            </a:r>
+            <a:r>
+              <a:rPr lang="fr-FR" dirty="0" err="1" smtClean="0"/>
+              <a:t>waypoint</a:t>
+            </a:r>
+            <a:r>
+              <a:rPr lang="fr-FR" dirty="0" smtClean="0"/>
+              <a:t> data </a:t>
+            </a:r>
+            <a:r>
+              <a:rPr lang="fr-FR" dirty="0" err="1" smtClean="0"/>
+              <a:t>is</a:t>
+            </a:r>
+            <a:r>
+              <a:rPr lang="fr-FR" dirty="0" smtClean="0"/>
+              <a:t> not </a:t>
+            </a:r>
+            <a:r>
+              <a:rPr lang="fr-FR" dirty="0" err="1" smtClean="0"/>
+              <a:t>perfect</a:t>
+            </a:r>
+            <a:r>
+              <a:rPr lang="fr-FR" dirty="0" smtClean="0"/>
+              <a:t> (i.e. </a:t>
+            </a:r>
+            <a:r>
+              <a:rPr lang="fr-FR" dirty="0" err="1" smtClean="0"/>
+              <a:t>consider</a:t>
+            </a:r>
+            <a:r>
+              <a:rPr lang="fr-FR" dirty="0" smtClean="0"/>
+              <a:t> GPS data noise)</a:t>
             </a:r>
           </a:p>
           <a:p>

</xml_diff>

<commit_message>
Presentation update with beautiful logo
</commit_message>
<xml_diff>
--- a/Presentation/Presentation.pptx
+++ b/Presentation/Presentation.pptx
@@ -2628,10 +2628,10 @@
           <a:lstStyle/>
           <a:p>
             <a:r>
-              <a:rPr lang="fr-CH" smtClean="0"/>
+              <a:rPr lang="fr-CH" dirty="0" smtClean="0"/>
               <a:t>Cliquez et modifiez le titre</a:t>
             </a:r>
-            <a:endParaRPr lang="en-US"/>
+            <a:endParaRPr lang="en-US" dirty="0"/>
           </a:p>
         </p:txBody>
       </p:sp>
@@ -2662,38 +2662,38 @@
           <a:p>
             <a:pPr lvl="0"/>
             <a:r>
-              <a:rPr lang="fr-CH" smtClean="0"/>
+              <a:rPr lang="fr-CH" dirty="0" smtClean="0"/>
               <a:t>Cliquez pour modifier les styles du texte du masque</a:t>
             </a:r>
           </a:p>
           <a:p>
             <a:pPr lvl="1"/>
             <a:r>
-              <a:rPr lang="fr-CH" smtClean="0"/>
+              <a:rPr lang="fr-CH" dirty="0" smtClean="0"/>
               <a:t>Deuxième niveau</a:t>
             </a:r>
           </a:p>
           <a:p>
             <a:pPr lvl="2"/>
             <a:r>
-              <a:rPr lang="fr-CH" smtClean="0"/>
+              <a:rPr lang="fr-CH" dirty="0" smtClean="0"/>
               <a:t>Troisième niveau</a:t>
             </a:r>
           </a:p>
           <a:p>
             <a:pPr lvl="3"/>
             <a:r>
-              <a:rPr lang="fr-CH" smtClean="0"/>
+              <a:rPr lang="fr-CH" dirty="0" smtClean="0"/>
               <a:t>Quatrième niveau</a:t>
             </a:r>
           </a:p>
           <a:p>
             <a:pPr lvl="4"/>
             <a:r>
-              <a:rPr lang="fr-CH" smtClean="0"/>
+              <a:rPr lang="fr-CH" dirty="0" smtClean="0"/>
               <a:t>Cinquième niveau</a:t>
             </a:r>
-            <a:endParaRPr lang="en-US"/>
+            <a:endParaRPr lang="en-US" dirty="0"/>
           </a:p>
         </p:txBody>
       </p:sp>
@@ -2844,13 +2844,13 @@
           <a:spcPct val="0"/>
         </a:spcBef>
         <a:buNone/>
-        <a:defRPr sz="4400" kern="1200">
+        <a:defRPr sz="5000" kern="1200">
           <a:solidFill>
             <a:schemeClr val="tx1"/>
           </a:solidFill>
-          <a:latin typeface="+mj-lt"/>
+          <a:latin typeface="Roboto Light"/>
           <a:ea typeface="+mj-ea"/>
-          <a:cs typeface="+mj-cs"/>
+          <a:cs typeface="Roboto Light"/>
         </a:defRPr>
       </a:lvl1pPr>
     </p:titleStyle>
@@ -2865,9 +2865,9 @@
           <a:solidFill>
             <a:schemeClr val="tx1"/>
           </a:solidFill>
-          <a:latin typeface="+mn-lt"/>
+          <a:latin typeface="Roboto Light"/>
           <a:ea typeface="+mn-ea"/>
-          <a:cs typeface="+mn-cs"/>
+          <a:cs typeface="Roboto Light"/>
         </a:defRPr>
       </a:lvl1pPr>
       <a:lvl2pPr marL="742950" indent="-285750" algn="l" defTabSz="914400" rtl="0" eaLnBrk="1" latinLnBrk="0" hangingPunct="1">
@@ -2880,9 +2880,9 @@
           <a:solidFill>
             <a:schemeClr val="tx1"/>
           </a:solidFill>
-          <a:latin typeface="+mn-lt"/>
+          <a:latin typeface="Roboto Light"/>
           <a:ea typeface="+mn-ea"/>
-          <a:cs typeface="+mn-cs"/>
+          <a:cs typeface="Roboto Light"/>
         </a:defRPr>
       </a:lvl2pPr>
       <a:lvl3pPr marL="1143000" indent="-228600" algn="l" defTabSz="914400" rtl="0" eaLnBrk="1" latinLnBrk="0" hangingPunct="1">
@@ -2895,9 +2895,9 @@
           <a:solidFill>
             <a:schemeClr val="tx1"/>
           </a:solidFill>
-          <a:latin typeface="+mn-lt"/>
+          <a:latin typeface="Roboto Light"/>
           <a:ea typeface="+mn-ea"/>
-          <a:cs typeface="+mn-cs"/>
+          <a:cs typeface="Roboto Light"/>
         </a:defRPr>
       </a:lvl3pPr>
       <a:lvl4pPr marL="1600200" indent="-228600" algn="l" defTabSz="914400" rtl="0" eaLnBrk="1" latinLnBrk="0" hangingPunct="1">
@@ -2910,9 +2910,9 @@
           <a:solidFill>
             <a:schemeClr val="tx1"/>
           </a:solidFill>
-          <a:latin typeface="+mn-lt"/>
+          <a:latin typeface="Roboto Light"/>
           <a:ea typeface="+mn-ea"/>
-          <a:cs typeface="+mn-cs"/>
+          <a:cs typeface="Roboto Light"/>
         </a:defRPr>
       </a:lvl4pPr>
       <a:lvl5pPr marL="2057400" indent="-228600" algn="l" defTabSz="914400" rtl="0" eaLnBrk="1" latinLnBrk="0" hangingPunct="1">
@@ -2925,9 +2925,9 @@
           <a:solidFill>
             <a:schemeClr val="tx1"/>
           </a:solidFill>
-          <a:latin typeface="+mn-lt"/>
+          <a:latin typeface="Roboto Light"/>
           <a:ea typeface="+mn-ea"/>
-          <a:cs typeface="+mn-cs"/>
+          <a:cs typeface="Roboto Light"/>
         </a:defRPr>
       </a:lvl5pPr>
       <a:lvl6pPr marL="2514600" indent="-228600" algn="l" defTabSz="914400" rtl="0" eaLnBrk="1" latinLnBrk="0" hangingPunct="1">
@@ -3125,47 +3125,83 @@
           <a:lstStyle/>
           <a:p>
             <a:r>
-              <a:rPr lang="fr-FR" sz="2700" dirty="0" smtClean="0"/>
+              <a:rPr lang="fr-FR" sz="2700" dirty="0" smtClean="0">
+                <a:latin typeface="Roboto Light"/>
+                <a:cs typeface="Roboto Light"/>
+              </a:rPr>
               <a:t>Mobile Robots</a:t>
             </a:r>
             <a:br>
-              <a:rPr lang="fr-FR" sz="2700" dirty="0" smtClean="0"/>
+              <a:rPr lang="fr-FR" sz="2700" dirty="0" smtClean="0">
+                <a:latin typeface="Roboto Light"/>
+                <a:cs typeface="Roboto Light"/>
+              </a:rPr>
             </a:br>
             <a:r>
-              <a:rPr lang="fr-FR" dirty="0" smtClean="0"/>
-              <a:t>Mini-Project</a:t>
-            </a:r>
-            <a:r>
-              <a:rPr lang="fr-FR" dirty="0"/>
+              <a:rPr lang="fr-FR" dirty="0" smtClean="0">
+                <a:latin typeface="Roboto Light"/>
+                <a:cs typeface="Roboto Light"/>
+              </a:rPr>
+              <a:t>Mini-</a:t>
+            </a:r>
+            <a:r>
+              <a:rPr lang="fr-FR" dirty="0" smtClean="0">
+                <a:latin typeface="Roboto Light"/>
+                <a:cs typeface="Roboto Light"/>
+              </a:rPr>
+              <a:t>Project</a:t>
+            </a:r>
+            <a:r>
+              <a:rPr lang="fr-FR" dirty="0" smtClean="0">
+                <a:latin typeface="Roboto Light"/>
+                <a:cs typeface="Roboto Light"/>
+              </a:rPr>
+              <a:t/>
+            </a:r>
+            <a:br>
+              <a:rPr lang="fr-FR" dirty="0" smtClean="0">
+                <a:latin typeface="Roboto Light"/>
+                <a:cs typeface="Roboto Light"/>
+              </a:rPr>
+            </a:br>
+            <a:r>
+              <a:rPr lang="fr-FR" dirty="0" smtClean="0">
+                <a:latin typeface="Roboto Light"/>
+                <a:cs typeface="Roboto Light"/>
+              </a:rPr>
+              <a:t>GPS </a:t>
+            </a:r>
+            <a:r>
+              <a:rPr lang="fr-FR" dirty="0">
+                <a:latin typeface="Roboto Light"/>
+                <a:cs typeface="Roboto Light"/>
+              </a:rPr>
+              <a:t>Signal </a:t>
+            </a:r>
+            <a:r>
+              <a:rPr lang="fr-FR" dirty="0" err="1">
+                <a:latin typeface="Roboto Light"/>
+                <a:cs typeface="Roboto Light"/>
+              </a:rPr>
+              <a:t>Following</a:t>
+            </a:r>
+            <a:r>
+              <a:rPr lang="fr-FR" dirty="0">
+                <a:latin typeface="Roboto Light"/>
+                <a:cs typeface="Roboto Light"/>
+              </a:rPr>
               <a:t> </a:t>
             </a:r>
-            <a:r>
-              <a:rPr lang="fr-FR" dirty="0" smtClean="0"/>
-              <a:t>:</a:t>
-            </a:r>
             <a:br>
-              <a:rPr lang="fr-FR" dirty="0" smtClean="0"/>
+              <a:rPr lang="fr-FR" dirty="0">
+                <a:latin typeface="Roboto Light"/>
+                <a:cs typeface="Roboto Light"/>
+              </a:rPr>
             </a:br>
-            <a:r>
-              <a:rPr lang="fr-FR" dirty="0" smtClean="0"/>
-              <a:t>GPS </a:t>
-            </a:r>
-            <a:r>
-              <a:rPr lang="fr-FR" dirty="0"/>
-              <a:t>Signal </a:t>
-            </a:r>
-            <a:r>
-              <a:rPr lang="fr-FR" dirty="0" err="1"/>
-              <a:t>Following</a:t>
-            </a:r>
-            <a:r>
-              <a:rPr lang="fr-FR" dirty="0"/>
-              <a:t> </a:t>
-            </a:r>
-            <a:br>
-              <a:rPr lang="fr-FR" dirty="0"/>
-            </a:br>
-            <a:endParaRPr lang="fr-FR" dirty="0"/>
+            <a:endParaRPr lang="fr-FR" dirty="0">
+              <a:latin typeface="Roboto Light"/>
+              <a:cs typeface="Roboto Light"/>
+            </a:endParaRPr>
           </a:p>
         </p:txBody>
       </p:sp>
@@ -3193,10 +3229,16 @@
           <a:p>
             <a:pPr algn="l"/>
             <a:r>
-              <a:rPr lang="fr-FR" sz="2000" dirty="0" smtClean="0"/>
+              <a:rPr lang="fr-FR" sz="2000" dirty="0" smtClean="0">
+                <a:latin typeface="Roboto Light"/>
+                <a:cs typeface="Roboto Light"/>
+              </a:rPr>
               <a:t>Group N°11 (GPS 1)</a:t>
             </a:r>
-            <a:endParaRPr lang="fr-FR" sz="2000" dirty="0"/>
+            <a:endParaRPr lang="fr-FR" sz="2000" dirty="0">
+              <a:latin typeface="Roboto Light"/>
+              <a:cs typeface="Roboto Light"/>
+            </a:endParaRPr>
           </a:p>
         </p:txBody>
       </p:sp>
@@ -3223,61 +3265,127 @@
           <a:lstStyle/>
           <a:p>
             <a:r>
-              <a:rPr lang="fr-FR" sz="2400" dirty="0" err="1"/>
+              <a:rPr lang="fr-FR" sz="2400" dirty="0" err="1">
+                <a:latin typeface="Roboto Light"/>
+                <a:cs typeface="Roboto Light"/>
+              </a:rPr>
               <a:t>Arreguit</a:t>
             </a:r>
             <a:r>
-              <a:rPr lang="fr-FR" sz="2400" dirty="0"/>
+              <a:rPr lang="fr-FR" sz="2400" dirty="0">
+                <a:latin typeface="Roboto Light"/>
+                <a:cs typeface="Roboto Light"/>
+              </a:rPr>
               <a:t> </a:t>
             </a:r>
             <a:r>
-              <a:rPr lang="fr-FR" sz="2400" dirty="0" smtClean="0"/>
+              <a:rPr lang="fr-FR" sz="2400" dirty="0" smtClean="0">
+                <a:latin typeface="Roboto Light"/>
+                <a:cs typeface="Roboto Light"/>
+              </a:rPr>
               <a:t>Jonathan</a:t>
             </a:r>
           </a:p>
           <a:p>
             <a:r>
-              <a:rPr lang="fr-FR" sz="2400" dirty="0" smtClean="0"/>
+              <a:rPr lang="fr-FR" sz="2400" dirty="0" smtClean="0">
+                <a:latin typeface="Roboto Light"/>
+                <a:cs typeface="Roboto Light"/>
+              </a:rPr>
               <a:t>Konrad Dorian</a:t>
             </a:r>
           </a:p>
           <a:p>
             <a:r>
-              <a:rPr lang="fr-FR" sz="2400" dirty="0" err="1" smtClean="0"/>
+              <a:rPr lang="fr-FR" sz="2400" dirty="0" err="1" smtClean="0">
+                <a:latin typeface="Roboto Light"/>
+                <a:cs typeface="Roboto Light"/>
+              </a:rPr>
               <a:t>Missri</a:t>
             </a:r>
             <a:r>
-              <a:rPr lang="fr-FR" sz="2400" dirty="0" smtClean="0"/>
+              <a:rPr lang="fr-FR" sz="2400" dirty="0" smtClean="0">
+                <a:latin typeface="Roboto Light"/>
+                <a:cs typeface="Roboto Light"/>
+              </a:rPr>
               <a:t> </a:t>
             </a:r>
             <a:r>
-              <a:rPr lang="fr-FR" sz="2400" dirty="0"/>
+              <a:rPr lang="fr-FR" sz="2400" dirty="0">
+                <a:latin typeface="Roboto Light"/>
+                <a:cs typeface="Roboto Light"/>
+              </a:rPr>
               <a:t>Salah-</a:t>
             </a:r>
             <a:r>
-              <a:rPr lang="fr-FR" sz="2400" dirty="0" smtClean="0"/>
+              <a:rPr lang="fr-FR" sz="2400" dirty="0" smtClean="0">
+                <a:latin typeface="Roboto Light"/>
+                <a:cs typeface="Roboto Light"/>
+              </a:rPr>
               <a:t>Eddine</a:t>
             </a:r>
           </a:p>
           <a:p>
             <a:r>
-              <a:rPr lang="fr-FR" sz="2400" dirty="0" err="1" smtClean="0"/>
+              <a:rPr lang="fr-FR" sz="2400" dirty="0" err="1" smtClean="0">
+                <a:latin typeface="Roboto Light"/>
+                <a:cs typeface="Roboto Light"/>
+              </a:rPr>
               <a:t>Tauxe</a:t>
             </a:r>
             <a:r>
-              <a:rPr lang="fr-FR" sz="2400" dirty="0" smtClean="0"/>
+              <a:rPr lang="fr-FR" sz="2400" dirty="0" smtClean="0">
+                <a:latin typeface="Roboto Light"/>
+                <a:cs typeface="Roboto Light"/>
+              </a:rPr>
               <a:t> </a:t>
             </a:r>
             <a:r>
-              <a:rPr lang="fr-FR" sz="2400" dirty="0"/>
+              <a:rPr lang="fr-FR" sz="2400" dirty="0">
+                <a:latin typeface="Roboto Light"/>
+                <a:cs typeface="Roboto Light"/>
+              </a:rPr>
               <a:t>David </a:t>
             </a:r>
           </a:p>
           <a:p>
-            <a:endParaRPr lang="fr-FR" sz="2400" dirty="0"/>
-          </a:p>
-        </p:txBody>
-      </p:sp>
+            <a:endParaRPr lang="fr-FR" sz="2400" dirty="0">
+              <a:latin typeface="Roboto  "/>
+              <a:cs typeface="Roboto  "/>
+            </a:endParaRPr>
+          </a:p>
+        </p:txBody>
+      </p:sp>
+      <p:pic>
+        <p:nvPicPr>
+          <p:cNvPr id="5" name="Image 4" descr="logo.png"/>
+          <p:cNvPicPr>
+            <a:picLocks noChangeAspect="1"/>
+          </p:cNvPicPr>
+          <p:nvPr/>
+        </p:nvPicPr>
+        <p:blipFill>
+          <a:blip r:embed="rId2">
+            <a:extLst>
+              <a:ext uri="{28A0092B-C50C-407E-A947-70E740481C1C}">
+                <a14:useLocalDpi xmlns:a14="http://schemas.microsoft.com/office/drawing/2010/main" val="0"/>
+              </a:ext>
+            </a:extLst>
+          </a:blip>
+          <a:stretch>
+            <a:fillRect/>
+          </a:stretch>
+        </p:blipFill>
+        <p:spPr>
+          <a:xfrm rot="20012932">
+            <a:off x="403882" y="403884"/>
+            <a:ext cx="2370559" cy="2370559"/>
+          </a:xfrm>
+          <a:prstGeom prst="rect">
+            <a:avLst/>
+          </a:prstGeom>
+        </p:spPr>
+      </p:pic>
     </p:spTree>
     <p:extLst>
       <p:ext uri="{BB962C8B-B14F-4D97-AF65-F5344CB8AC3E}">
@@ -3360,19 +3468,39 @@
           <a:p>
             <a:r>
               <a:rPr lang="fr-FR" dirty="0" smtClean="0"/>
-              <a:t>Dimension </a:t>
-            </a:r>
-            <a:r>
-              <a:rPr lang="fr-FR" dirty="0" err="1" smtClean="0"/>
-              <a:t>decoupling</a:t>
+              <a:t>The d</a:t>
+            </a:r>
+            <a:r>
+              <a:rPr lang="fr-FR" dirty="0" smtClean="0"/>
+              <a:t>imensions are </a:t>
+            </a:r>
+            <a:r>
+              <a:rPr lang="fr-FR" dirty="0" err="1" smtClean="0"/>
+              <a:t>decoupled</a:t>
             </a:r>
             <a:endParaRPr lang="fr-FR" dirty="0" smtClean="0"/>
           </a:p>
           <a:p>
             <a:pPr lvl="1"/>
             <a:r>
-              <a:rPr lang="fr-FR" dirty="0" smtClean="0"/>
-              <a:t>Can </a:t>
+              <a:rPr lang="fr-FR" dirty="0" err="1" smtClean="0"/>
+              <a:t>We</a:t>
+            </a:r>
+            <a:r>
+              <a:rPr lang="fr-FR" dirty="0" smtClean="0"/>
+              <a:t> </a:t>
+            </a:r>
+            <a:r>
+              <a:rPr lang="fr-FR" dirty="0" err="1" smtClean="0"/>
+              <a:t>c</a:t>
+            </a:r>
+            <a:r>
+              <a:rPr lang="fr-FR" dirty="0" err="1" smtClean="0"/>
+              <a:t>an</a:t>
+            </a:r>
+            <a:r>
+              <a:rPr lang="fr-FR" dirty="0" smtClean="0"/>
+              <a:t> </a:t>
             </a:r>
             <a:r>
               <a:rPr lang="fr-FR" dirty="0" err="1" smtClean="0"/>
@@ -3399,12 +3527,24 @@
           </a:p>
           <a:p>
             <a:r>
-              <a:rPr lang="fr-FR" dirty="0" err="1" smtClean="0"/>
-              <a:t>Waypoint</a:t>
-            </a:r>
-            <a:r>
-              <a:rPr lang="fr-FR" dirty="0" smtClean="0"/>
-              <a:t> data </a:t>
+              <a:rPr lang="fr-FR" dirty="0" smtClean="0"/>
+              <a:t>The </a:t>
+            </a:r>
+            <a:r>
+              <a:rPr lang="fr-FR" dirty="0" err="1" smtClean="0"/>
+              <a:t>w</a:t>
+            </a:r>
+            <a:r>
+              <a:rPr lang="fr-FR" dirty="0" err="1" smtClean="0"/>
+              <a:t>aypoint</a:t>
+            </a:r>
+            <a:r>
+              <a:rPr lang="fr-FR" dirty="0" smtClean="0"/>
+              <a:t> </a:t>
+            </a:r>
+            <a:r>
+              <a:rPr lang="fr-FR" dirty="0" smtClean="0"/>
+              <a:t>data </a:t>
             </a:r>
             <a:r>
               <a:rPr lang="fr-FR" dirty="0" err="1" smtClean="0"/>
@@ -3432,7 +3572,11 @@
             </a:r>
             <a:r>
               <a:rPr lang="fr-FR" dirty="0" err="1" smtClean="0"/>
-              <a:t>Quadcopter</a:t>
+              <a:t>q</a:t>
+            </a:r>
+            <a:r>
+              <a:rPr lang="fr-FR" dirty="0" err="1" smtClean="0"/>
+              <a:t>uadrotor</a:t>
             </a:r>
             <a:r>
               <a:rPr lang="fr-FR" dirty="0" smtClean="0"/>
@@ -3442,10 +3586,7 @@
               <a:rPr lang="fr-FR" dirty="0" err="1" smtClean="0"/>
               <a:t>error</a:t>
             </a:r>
-            <a:r>
-              <a:rPr lang="fr-FR" dirty="0" smtClean="0"/>
-              <a:t>.</a:t>
-            </a:r>
+            <a:endParaRPr lang="fr-FR" dirty="0" smtClean="0"/>
           </a:p>
           <a:p>
             <a:endParaRPr lang="fr-FR" dirty="0" smtClean="0"/>
@@ -4189,16 +4330,29 @@
             <p:ph type="title"/>
           </p:nvPr>
         </p:nvSpPr>
-        <p:spPr/>
+        <p:spPr>
+          <a:xfrm>
+            <a:off x="457200" y="726768"/>
+            <a:ext cx="8229600" cy="873432"/>
+          </a:xfrm>
+        </p:spPr>
         <p:txBody>
           <a:bodyPr>
-            <a:normAutofit fontScale="90000"/>
+            <a:noAutofit/>
           </a:bodyPr>
           <a:lstStyle/>
           <a:p>
             <a:r>
               <a:rPr lang="fr-FR" dirty="0" err="1" smtClean="0"/>
               <a:t>Kalman</a:t>
+            </a:r>
+            <a:r>
+              <a:rPr lang="fr-FR" dirty="0" smtClean="0"/>
+              <a:t> </a:t>
+            </a:r>
+            <a:r>
+              <a:rPr lang="fr-FR" dirty="0" err="1" smtClean="0"/>
+              <a:t>predictor</a:t>
             </a:r>
             <a:r>
               <a:rPr lang="fr-FR" dirty="0" smtClean="0"/>
@@ -4221,68 +4375,192 @@
             <p:ph idx="1"/>
           </p:nvPr>
         </p:nvSpPr>
-        <p:spPr/>
+        <p:spPr>
+          <a:xfrm>
+            <a:off x="457200" y="1600200"/>
+            <a:ext cx="8229600" cy="3711968"/>
+          </a:xfrm>
+        </p:spPr>
         <p:txBody>
           <a:bodyPr>
-            <a:normAutofit lnSpcReduction="10000"/>
+            <a:normAutofit fontScale="92500" lnSpcReduction="20000"/>
           </a:bodyPr>
           <a:lstStyle/>
           <a:p>
             <a:r>
-              <a:rPr lang="fr-FR" dirty="0" smtClean="0"/>
-              <a:t>Permet de formaliser la démarche et de prendre en compte des incertitudes sur l’</a:t>
-            </a:r>
-            <a:r>
-              <a:rPr lang="fr-FR" dirty="0" err="1" smtClean="0"/>
-              <a:t>accelération</a:t>
-            </a:r>
-            <a:r>
-              <a:rPr lang="fr-FR" dirty="0" smtClean="0"/>
-              <a:t>.</a:t>
-            </a:r>
-          </a:p>
-          <a:p>
-            <a:r>
-              <a:rPr lang="fr-FR" dirty="0" err="1"/>
-              <a:t>Decoupling</a:t>
-            </a:r>
+              <a:rPr lang="fr-FR" dirty="0" err="1" smtClean="0"/>
+              <a:t>Kalman</a:t>
+            </a:r>
+            <a:r>
+              <a:rPr lang="fr-FR" dirty="0" smtClean="0"/>
+              <a:t> </a:t>
+            </a:r>
+            <a:r>
+              <a:rPr lang="fr-FR" dirty="0" err="1" smtClean="0"/>
+              <a:t>filter</a:t>
+            </a:r>
+            <a:r>
+              <a:rPr lang="fr-FR" dirty="0" smtClean="0"/>
+              <a:t> </a:t>
+            </a:r>
+            <a:r>
+              <a:rPr lang="fr-FR" dirty="0" err="1" smtClean="0"/>
+              <a:t>used</a:t>
+            </a:r>
+            <a:r>
+              <a:rPr lang="fr-FR" dirty="0" smtClean="0"/>
+              <a:t> as a </a:t>
+            </a:r>
+            <a:r>
+              <a:rPr lang="fr-FR" dirty="0" err="1" smtClean="0"/>
+              <a:t>predictor</a:t>
+            </a:r>
+            <a:r>
+              <a:rPr lang="fr-FR" dirty="0" smtClean="0"/>
+              <a:t>:</a:t>
+            </a:r>
+            <a:endParaRPr lang="fr-FR" dirty="0"/>
+          </a:p>
+          <a:p>
+            <a:pPr lvl="1"/>
+            <a:r>
+              <a:rPr lang="fr-FR" dirty="0" err="1" smtClean="0"/>
+              <a:t>P</a:t>
+            </a:r>
+            <a:r>
+              <a:rPr lang="fr-FR" dirty="0" err="1" smtClean="0"/>
+              <a:t>rediction</a:t>
+            </a:r>
+            <a:r>
+              <a:rPr lang="fr-FR" dirty="0" smtClean="0"/>
+              <a:t> </a:t>
+            </a:r>
+            <a:r>
+              <a:rPr lang="fr-FR" dirty="0" err="1" smtClean="0"/>
+              <a:t>loop</a:t>
+            </a:r>
+            <a:r>
+              <a:rPr lang="fr-FR" dirty="0" smtClean="0"/>
+              <a:t> </a:t>
+            </a:r>
+            <a:r>
+              <a:rPr lang="fr-FR" dirty="0" err="1" smtClean="0"/>
+              <a:t>runs</a:t>
+            </a:r>
+            <a:r>
+              <a:rPr lang="fr-FR" dirty="0" smtClean="0"/>
+              <a:t> </a:t>
+            </a:r>
+            <a:r>
+              <a:rPr lang="fr-FR" dirty="0" err="1" smtClean="0"/>
+              <a:t>constantly</a:t>
+            </a:r>
+            <a:endParaRPr lang="fr-FR" dirty="0" smtClean="0"/>
+          </a:p>
+          <a:p>
+            <a:pPr lvl="1"/>
             <a:r>
               <a:rPr lang="fr-FR" dirty="0"/>
-              <a:t> the </a:t>
-            </a:r>
-            <a:r>
-              <a:rPr lang="fr-FR" dirty="0" err="1"/>
-              <a:t>Kalman</a:t>
+              <a:t>C</a:t>
+            </a:r>
+            <a:r>
+              <a:rPr lang="fr-FR" dirty="0" smtClean="0"/>
+              <a:t>orrection of the </a:t>
+            </a:r>
+            <a:r>
+              <a:rPr lang="fr-FR" dirty="0" err="1" smtClean="0"/>
+              <a:t>prediction</a:t>
+            </a:r>
+            <a:r>
+              <a:rPr lang="fr-FR" dirty="0" smtClean="0"/>
+              <a:t> </a:t>
+            </a:r>
+            <a:r>
+              <a:rPr lang="fr-FR" dirty="0" err="1" smtClean="0"/>
+              <a:t>happens</a:t>
+            </a:r>
+            <a:r>
+              <a:rPr lang="fr-FR" dirty="0" smtClean="0"/>
+              <a:t> </a:t>
+            </a:r>
+            <a:r>
+              <a:rPr lang="fr-FR" dirty="0" err="1" smtClean="0"/>
+              <a:t>only</a:t>
+            </a:r>
+            <a:r>
+              <a:rPr lang="fr-FR" dirty="0" smtClean="0"/>
+              <a:t> </a:t>
+            </a:r>
+            <a:r>
+              <a:rPr lang="fr-FR" dirty="0" err="1" smtClean="0"/>
+              <a:t>when</a:t>
+            </a:r>
+            <a:r>
+              <a:rPr lang="fr-FR" dirty="0" smtClean="0"/>
+              <a:t> </a:t>
+            </a:r>
+            <a:r>
+              <a:rPr lang="fr-FR" dirty="0" err="1" smtClean="0"/>
+              <a:t>there</a:t>
+            </a:r>
+            <a:r>
+              <a:rPr lang="fr-FR" dirty="0" smtClean="0"/>
+              <a:t> </a:t>
+            </a:r>
+            <a:r>
+              <a:rPr lang="fr-FR" dirty="0" err="1" smtClean="0"/>
+              <a:t>is</a:t>
             </a:r>
             <a:r>
               <a:rPr lang="fr-FR" dirty="0"/>
               <a:t> </a:t>
             </a:r>
             <a:r>
-              <a:rPr lang="fr-FR" dirty="0" err="1"/>
-              <a:t>predictor</a:t>
-            </a:r>
-            <a:r>
-              <a:rPr lang="fr-FR" dirty="0"/>
+              <a:rPr lang="fr-FR" dirty="0" smtClean="0"/>
+              <a:t>a new </a:t>
+            </a:r>
+            <a:r>
+              <a:rPr lang="fr-FR" dirty="0" err="1" smtClean="0"/>
+              <a:t>measurement</a:t>
+            </a:r>
+            <a:r>
+              <a:rPr lang="fr-FR" dirty="0" smtClean="0"/>
+              <a:t> (</a:t>
+            </a:r>
+            <a:r>
+              <a:rPr lang="fr-FR" dirty="0" err="1" smtClean="0"/>
+              <a:t>ie</a:t>
+            </a:r>
+            <a:r>
+              <a:rPr lang="fr-FR" dirty="0" smtClean="0"/>
               <a:t> </a:t>
             </a:r>
             <a:r>
-              <a:rPr lang="fr-FR" dirty="0" smtClean="0"/>
-              <a:t>(</a:t>
-            </a:r>
-            <a:r>
-              <a:rPr lang="fr-FR" dirty="0" err="1" smtClean="0"/>
-              <a:t>assumption</a:t>
+              <a:rPr lang="fr-FR" dirty="0" err="1" smtClean="0"/>
+              <a:t>received</a:t>
+            </a:r>
+            <a:r>
+              <a:rPr lang="fr-FR" dirty="0" smtClean="0"/>
+              <a:t> </a:t>
+            </a:r>
+            <a:r>
+              <a:rPr lang="fr-FR" dirty="0" err="1" smtClean="0"/>
+              <a:t>waypoint</a:t>
             </a:r>
             <a:r>
               <a:rPr lang="fr-FR" dirty="0" smtClean="0"/>
               <a:t>)</a:t>
             </a:r>
-            <a:endParaRPr lang="fr-FR" dirty="0"/>
-          </a:p>
-          <a:p>
-            <a:r>
-              <a:rPr lang="fr-FR" dirty="0"/>
+          </a:p>
+          <a:p>
+            <a:pPr marL="457200" lvl="1" indent="0">
+              <a:buNone/>
+            </a:pPr>
+            <a:endParaRPr lang="fr-FR" sz="1200" dirty="0" smtClean="0"/>
+          </a:p>
+          <a:p>
+            <a:r>
+              <a:rPr lang="fr-FR" dirty="0" smtClean="0"/>
               <a:t>Constant </a:t>
             </a:r>
             <a:r>
@@ -4291,172 +4569,34 @@
             </a:r>
             <a:r>
               <a:rPr lang="fr-FR" dirty="0"/>
+              <a:t> motion </a:t>
+            </a:r>
+            <a:r>
+              <a:rPr lang="fr-FR" dirty="0" smtClean="0"/>
+              <a:t>model</a:t>
+            </a:r>
+          </a:p>
+          <a:p>
+            <a:endParaRPr lang="fr-FR" sz="1800" dirty="0" smtClean="0"/>
+          </a:p>
+          <a:p>
+            <a:pPr marL="0" indent="0">
+              <a:buNone/>
+            </a:pPr>
+            <a:endParaRPr lang="fr-FR" dirty="0"/>
+          </a:p>
+          <a:p>
+            <a:r>
+              <a:rPr lang="fr-FR" dirty="0" smtClean="0"/>
+              <a:t>Constant </a:t>
+            </a:r>
+            <a:r>
+              <a:rPr lang="fr-FR" dirty="0" err="1" smtClean="0"/>
+              <a:t>acceleration</a:t>
+            </a:r>
+            <a:r>
+              <a:rPr lang="fr-FR" dirty="0" smtClean="0"/>
               <a:t> motion model </a:t>
-            </a:r>
-          </a:p>
-          <a:p>
-            <a:pPr lvl="1"/>
-            <a:r>
-              <a:rPr lang="fr-FR" dirty="0"/>
-              <a:t>􏰂 </a:t>
-            </a:r>
-            <a:r>
-              <a:rPr lang="fr-FR" dirty="0" err="1"/>
-              <a:t>xk</a:t>
-            </a:r>
-            <a:r>
-              <a:rPr lang="fr-FR" dirty="0"/>
-              <a:t> =xk−1 +x ̇k−1∆</a:t>
-            </a:r>
-            <a:r>
-              <a:rPr lang="fr-FR" dirty="0" smtClean="0"/>
-              <a:t>t</a:t>
-            </a:r>
-          </a:p>
-          <a:p>
-            <a:r>
-              <a:rPr lang="fr-FR" dirty="0" smtClean="0"/>
-              <a:t> </a:t>
-            </a:r>
-            <a:r>
-              <a:rPr lang="fr-FR" dirty="0"/>
-              <a:t>Constant </a:t>
-            </a:r>
-            <a:r>
-              <a:rPr lang="fr-FR" dirty="0" err="1"/>
-              <a:t>acceleration</a:t>
-            </a:r>
-            <a:r>
-              <a:rPr lang="fr-FR" dirty="0"/>
-              <a:t> motion model </a:t>
-            </a:r>
-            <a:endParaRPr lang="fr-FR" dirty="0" smtClean="0"/>
-          </a:p>
-          <a:p>
-            <a:pPr lvl="1"/>
-            <a:r>
-              <a:rPr lang="cs-CZ" dirty="0" err="1"/>
-              <a:t>x</a:t>
-            </a:r>
-            <a:r>
-              <a:rPr lang="cs-CZ" dirty="0"/>
-              <a:t> </a:t>
-            </a:r>
-            <a:r>
-              <a:rPr lang="cs-CZ" sz="1200" dirty="0"/>
-              <a:t>k </a:t>
-            </a:r>
-            <a:r>
-              <a:rPr lang="cs-CZ" dirty="0"/>
-              <a:t>= </a:t>
-            </a:r>
-            <a:r>
-              <a:rPr lang="cs-CZ" dirty="0" err="1"/>
-              <a:t>x</a:t>
-            </a:r>
-            <a:r>
-              <a:rPr lang="cs-CZ" dirty="0"/>
-              <a:t> </a:t>
-            </a:r>
-            <a:r>
-              <a:rPr lang="cs-CZ" sz="1200" dirty="0"/>
-              <a:t>k − 1 </a:t>
-            </a:r>
-            <a:r>
-              <a:rPr lang="cs-CZ" dirty="0"/>
-              <a:t>+ </a:t>
-            </a:r>
-            <a:r>
-              <a:rPr lang="cs-CZ" dirty="0" err="1"/>
-              <a:t>x</a:t>
-            </a:r>
-            <a:r>
-              <a:rPr lang="cs-CZ" dirty="0"/>
-              <a:t> ̇ </a:t>
-            </a:r>
-            <a:r>
-              <a:rPr lang="cs-CZ" sz="1200" dirty="0"/>
-              <a:t>k − 1 </a:t>
-            </a:r>
-            <a:r>
-              <a:rPr lang="cs-CZ" dirty="0"/>
-              <a:t>∆ t + </a:t>
-            </a:r>
-            <a:r>
-              <a:rPr lang="cs-CZ" sz="1200" dirty="0"/>
-              <a:t>1 </a:t>
-            </a:r>
-            <a:r>
-              <a:rPr lang="cs-CZ" dirty="0" err="1"/>
-              <a:t>x</a:t>
-            </a:r>
-            <a:r>
-              <a:rPr lang="cs-CZ" dirty="0"/>
-              <a:t> ̈ </a:t>
-            </a:r>
-            <a:r>
-              <a:rPr lang="cs-CZ" sz="1200" dirty="0"/>
-              <a:t>k − 1 </a:t>
-            </a:r>
-            <a:r>
-              <a:rPr lang="cs-CZ" dirty="0"/>
-              <a:t>∆ t </a:t>
-            </a:r>
-            <a:r>
-              <a:rPr lang="cs-CZ" sz="1200" dirty="0"/>
-              <a:t>2 2 </a:t>
-            </a:r>
-            <a:endParaRPr lang="cs-CZ" dirty="0"/>
-          </a:p>
-          <a:p>
-            <a:pPr lvl="1"/>
-            <a:r>
-              <a:rPr lang="cs-CZ" dirty="0" err="1"/>
-              <a:t>x</a:t>
-            </a:r>
-            <a:r>
-              <a:rPr lang="cs-CZ" dirty="0"/>
-              <a:t> ̇ </a:t>
-            </a:r>
-            <a:r>
-              <a:rPr lang="cs-CZ" sz="1200" dirty="0"/>
-              <a:t>k </a:t>
-            </a:r>
-            <a:r>
-              <a:rPr lang="cs-CZ" dirty="0"/>
-              <a:t>= </a:t>
-            </a:r>
-            <a:r>
-              <a:rPr lang="cs-CZ" dirty="0" err="1"/>
-              <a:t>x</a:t>
-            </a:r>
-            <a:r>
-              <a:rPr lang="cs-CZ" dirty="0"/>
-              <a:t> ̇ </a:t>
-            </a:r>
-            <a:r>
-              <a:rPr lang="cs-CZ" sz="1200" dirty="0"/>
-              <a:t>k − 1 </a:t>
-            </a:r>
-            <a:r>
-              <a:rPr lang="cs-CZ" dirty="0"/>
-              <a:t>+ </a:t>
-            </a:r>
-            <a:r>
-              <a:rPr lang="cs-CZ" dirty="0" err="1"/>
-              <a:t>x</a:t>
-            </a:r>
-            <a:r>
-              <a:rPr lang="cs-CZ" dirty="0"/>
-              <a:t> ̈ </a:t>
-            </a:r>
-            <a:r>
-              <a:rPr lang="cs-CZ" sz="1200" dirty="0"/>
-              <a:t>k − 1 </a:t>
-            </a:r>
-            <a:r>
-              <a:rPr lang="cs-CZ" dirty="0"/>
-              <a:t>∆ t </a:t>
             </a:r>
           </a:p>
           <a:p>
@@ -4465,14 +4605,70 @@
           </a:p>
           <a:p>
             <a:pPr lvl="1"/>
-            <a:endParaRPr lang="fr-FR" dirty="0"/>
-          </a:p>
-          <a:p>
-            <a:pPr lvl="1"/>
             <a:endParaRPr lang="fr-FR" dirty="0" smtClean="0"/>
           </a:p>
         </p:txBody>
       </p:sp>
+      <p:pic>
+        <p:nvPicPr>
+          <p:cNvPr id="6" name="Image 5" descr="equcstacc.png"/>
+          <p:cNvPicPr>
+            <a:picLocks noChangeAspect="1"/>
+          </p:cNvPicPr>
+          <p:nvPr/>
+        </p:nvPicPr>
+        <p:blipFill>
+          <a:blip r:embed="rId2" cstate="print">
+            <a:extLst>
+              <a:ext uri="{28A0092B-C50C-407E-A947-70E740481C1C}">
+                <a14:useLocalDpi xmlns:a14="http://schemas.microsoft.com/office/drawing/2010/main" val="0"/>
+              </a:ext>
+            </a:extLst>
+          </a:blip>
+          <a:stretch>
+            <a:fillRect/>
+          </a:stretch>
+        </p:blipFill>
+        <p:spPr>
+          <a:xfrm>
+            <a:off x="1037731" y="5226975"/>
+            <a:ext cx="5440502" cy="1115810"/>
+          </a:xfrm>
+          <a:prstGeom prst="rect">
+            <a:avLst/>
+          </a:prstGeom>
+        </p:spPr>
+      </p:pic>
+      <p:pic>
+        <p:nvPicPr>
+          <p:cNvPr id="7" name="Image 6" descr="equcstvel.png"/>
+          <p:cNvPicPr>
+            <a:picLocks noChangeAspect="1"/>
+          </p:cNvPicPr>
+          <p:nvPr/>
+        </p:nvPicPr>
+        <p:blipFill>
+          <a:blip r:embed="rId3">
+            <a:extLst>
+              <a:ext uri="{28A0092B-C50C-407E-A947-70E740481C1C}">
+                <a14:useLocalDpi xmlns:a14="http://schemas.microsoft.com/office/drawing/2010/main" val="0"/>
+              </a:ext>
+            </a:extLst>
+          </a:blip>
+          <a:stretch>
+            <a:fillRect/>
+          </a:stretch>
+        </p:blipFill>
+        <p:spPr>
+          <a:xfrm>
+            <a:off x="1099683" y="4060453"/>
+            <a:ext cx="3794672" cy="756121"/>
+          </a:xfrm>
+          <a:prstGeom prst="rect">
+            <a:avLst/>
+          </a:prstGeom>
+        </p:spPr>
+      </p:pic>
     </p:spTree>
     <p:extLst>
       <p:ext uri="{BB962C8B-B14F-4D97-AF65-F5344CB8AC3E}">
@@ -4829,7 +5025,7 @@
       </p:sp>
       <p:pic>
         <p:nvPicPr>
-          <p:cNvPr id="7" name="Image 6" descr="PId.png"/>
+          <p:cNvPr id="7" name="Image 6"/>
           <p:cNvPicPr>
             <a:picLocks noChangeAspect="1"/>
           </p:cNvPicPr>
@@ -4849,8 +5045,8 @@
         </p:blipFill>
         <p:spPr>
           <a:xfrm>
-            <a:off x="806966" y="1651000"/>
-            <a:ext cx="7635732" cy="4193640"/>
+            <a:off x="837028" y="1651000"/>
+            <a:ext cx="7575607" cy="4193640"/>
           </a:xfrm>
           <a:prstGeom prst="rect">
             <a:avLst/>

</xml_diff>

<commit_message>
Presentation : adding final organigram
</commit_message>
<xml_diff>
--- a/Presentation/Presentation.pptx
+++ b/Presentation/Presentation.pptx
@@ -5098,8 +5098,8 @@
         </p:nvSpPr>
         <p:spPr>
           <a:xfrm>
-            <a:off x="300182" y="2251364"/>
-            <a:ext cx="8497454" cy="2782454"/>
+            <a:off x="136889" y="2251364"/>
+            <a:ext cx="8829345" cy="2593156"/>
           </a:xfrm>
           <a:prstGeom prst="roundRect">
             <a:avLst/>
@@ -5138,7 +5138,12 @@
             <p:ph type="title"/>
           </p:nvPr>
         </p:nvSpPr>
-        <p:spPr/>
+        <p:spPr>
+          <a:xfrm>
+            <a:off x="457200" y="274637"/>
+            <a:ext cx="8229600" cy="1801585"/>
+          </a:xfrm>
+        </p:spPr>
         <p:txBody>
           <a:bodyPr>
             <a:normAutofit/>
@@ -5155,15 +5160,13 @@
       </p:sp>
       <p:pic>
         <p:nvPicPr>
-          <p:cNvPr id="6" name="Espace réservé du contenu 5" descr="System.png"/>
+          <p:cNvPr id="3" name="Image 2" descr="Final_system_organigram.png"/>
           <p:cNvPicPr>
-            <a:picLocks noGrp="1" noChangeAspect="1"/>
+            <a:picLocks noChangeAspect="1"/>
           </p:cNvPicPr>
-          <p:nvPr>
-            <p:ph idx="1"/>
-          </p:nvPr>
+          <p:nvPr/>
         </p:nvPicPr>
-        <p:blipFill rotWithShape="1">
+        <p:blipFill>
           <a:blip r:embed="rId2">
             <a:extLst>
               <a:ext uri="{28A0092B-C50C-407E-A947-70E740481C1C}">
@@ -5171,14 +5174,18 @@
               </a:ext>
             </a:extLst>
           </a:blip>
-          <a:srcRect l="-10383" t="-17784" r="-4040" b="-7844"/>
-          <a:stretch/>
+          <a:stretch>
+            <a:fillRect/>
+          </a:stretch>
         </p:blipFill>
         <p:spPr>
           <a:xfrm>
-            <a:off x="-92364" y="2105872"/>
-            <a:ext cx="8779164" cy="2760904"/>
+            <a:off x="381071" y="2450946"/>
+            <a:ext cx="8345323" cy="2203443"/>
           </a:xfrm>
+          <a:prstGeom prst="rect">
+            <a:avLst/>
+          </a:prstGeom>
         </p:spPr>
       </p:pic>
     </p:spTree>

</xml_diff>